<commit_message>
minor edit - removed a few spaces after a bullet
</commit_message>
<xml_diff>
--- a/ProjectDoc/Assignment 10.pptx
+++ b/ProjectDoc/Assignment 10.pptx
@@ -105,6 +105,11 @@
       </a:defRPr>
     </a:lvl9pPr>
   </p:defaultTextStyle>
+  <p:extLst>
+    <p:ext uri="{EFAFB233-063F-42B5-8137-9DF3F51BA10A}">
+      <p15:sldGuideLst xmlns:p15="http://schemas.microsoft.com/office/powerpoint/2012/main"/>
+    </p:ext>
+  </p:extLst>
 </p:presentation>
 </file>
 
@@ -300,7 +305,7 @@
             <a:fld id="{B61BEF0D-F0BB-DE4B-95CE-6DB70DBA9567}" type="datetimeFigureOut">
               <a:rPr lang="en-US" dirty="0"/>
               <a:pPr/>
-              <a:t>12/6/2013</a:t>
+              <a:t>12/7/2013</a:t>
             </a:fld>
             <a:endParaRPr lang="en-US" dirty="0"/>
           </a:p>
@@ -733,7 +738,7 @@
             <a:fld id="{B61BEF0D-F0BB-DE4B-95CE-6DB70DBA9567}" type="datetimeFigureOut">
               <a:rPr lang="en-US" dirty="0"/>
               <a:pPr/>
-              <a:t>12/6/2013</a:t>
+              <a:t>12/7/2013</a:t>
             </a:fld>
             <a:endParaRPr lang="en-US" dirty="0"/>
           </a:p>
@@ -980,7 +985,7 @@
             <a:fld id="{B61BEF0D-F0BB-DE4B-95CE-6DB70DBA9567}" type="datetimeFigureOut">
               <a:rPr lang="en-US" dirty="0"/>
               <a:pPr/>
-              <a:t>12/6/2013</a:t>
+              <a:t>12/7/2013</a:t>
             </a:fld>
             <a:endParaRPr lang="en-US" dirty="0"/>
           </a:p>
@@ -1285,7 +1290,7 @@
             <a:fld id="{B61BEF0D-F0BB-DE4B-95CE-6DB70DBA9567}" type="datetimeFigureOut">
               <a:rPr lang="en-US" dirty="0"/>
               <a:pPr/>
-              <a:t>12/6/2013</a:t>
+              <a:t>12/7/2013</a:t>
             </a:fld>
             <a:endParaRPr lang="en-US" dirty="0"/>
           </a:p>
@@ -1600,7 +1605,7 @@
             <a:fld id="{B61BEF0D-F0BB-DE4B-95CE-6DB70DBA9567}" type="datetimeFigureOut">
               <a:rPr lang="en-US" dirty="0"/>
               <a:pPr/>
-              <a:t>12/6/2013</a:t>
+              <a:t>12/7/2013</a:t>
             </a:fld>
             <a:endParaRPr lang="en-US" dirty="0"/>
           </a:p>
@@ -1899,7 +1904,7 @@
             <a:fld id="{B61BEF0D-F0BB-DE4B-95CE-6DB70DBA9567}" type="datetimeFigureOut">
               <a:rPr lang="en-US" dirty="0"/>
               <a:pPr/>
-              <a:t>12/6/2013</a:t>
+              <a:t>12/7/2013</a:t>
             </a:fld>
             <a:endParaRPr lang="en-US" dirty="0"/>
           </a:p>
@@ -2263,7 +2268,7 @@
             <a:fld id="{B61BEF0D-F0BB-DE4B-95CE-6DB70DBA9567}" type="datetimeFigureOut">
               <a:rPr lang="en-US" dirty="0"/>
               <a:pPr/>
-              <a:t>12/6/2013</a:t>
+              <a:t>12/7/2013</a:t>
             </a:fld>
             <a:endParaRPr lang="en-US" dirty="0"/>
           </a:p>
@@ -2434,7 +2439,7 @@
             <a:fld id="{B61BEF0D-F0BB-DE4B-95CE-6DB70DBA9567}" type="datetimeFigureOut">
               <a:rPr lang="en-US" dirty="0"/>
               <a:pPr/>
-              <a:t>12/6/2013</a:t>
+              <a:t>12/7/2013</a:t>
             </a:fld>
             <a:endParaRPr lang="en-US" dirty="0"/>
           </a:p>
@@ -2611,7 +2616,7 @@
             <a:fld id="{B61BEF0D-F0BB-DE4B-95CE-6DB70DBA9567}" type="datetimeFigureOut">
               <a:rPr lang="en-US" dirty="0"/>
               <a:pPr/>
-              <a:t>12/6/2013</a:t>
+              <a:t>12/7/2013</a:t>
             </a:fld>
             <a:endParaRPr lang="en-US" dirty="0"/>
           </a:p>
@@ -2778,7 +2783,7 @@
             <a:fld id="{B61BEF0D-F0BB-DE4B-95CE-6DB70DBA9567}" type="datetimeFigureOut">
               <a:rPr lang="en-US" dirty="0"/>
               <a:pPr/>
-              <a:t>12/6/2013</a:t>
+              <a:t>12/7/2013</a:t>
             </a:fld>
             <a:endParaRPr lang="en-US" dirty="0"/>
           </a:p>
@@ -3025,7 +3030,7 @@
             <a:fld id="{B61BEF0D-F0BB-DE4B-95CE-6DB70DBA9567}" type="datetimeFigureOut">
               <a:rPr lang="en-US" dirty="0"/>
               <a:pPr/>
-              <a:t>12/6/2013</a:t>
+              <a:t>12/7/2013</a:t>
             </a:fld>
             <a:endParaRPr lang="en-US" dirty="0"/>
           </a:p>
@@ -3258,7 +3263,7 @@
             <a:fld id="{B61BEF0D-F0BB-DE4B-95CE-6DB70DBA9567}" type="datetimeFigureOut">
               <a:rPr lang="en-US" dirty="0"/>
               <a:pPr/>
-              <a:t>12/6/2013</a:t>
+              <a:t>12/7/2013</a:t>
             </a:fld>
             <a:endParaRPr lang="en-US" dirty="0"/>
           </a:p>
@@ -3637,7 +3642,7 @@
             <a:fld id="{B61BEF0D-F0BB-DE4B-95CE-6DB70DBA9567}" type="datetimeFigureOut">
               <a:rPr lang="en-US" dirty="0"/>
               <a:pPr/>
-              <a:t>12/6/2013</a:t>
+              <a:t>12/7/2013</a:t>
             </a:fld>
             <a:endParaRPr lang="en-US" dirty="0"/>
           </a:p>
@@ -3752,7 +3757,7 @@
             <a:fld id="{B61BEF0D-F0BB-DE4B-95CE-6DB70DBA9567}" type="datetimeFigureOut">
               <a:rPr lang="en-US" dirty="0"/>
               <a:pPr/>
-              <a:t>12/6/2013</a:t>
+              <a:t>12/7/2013</a:t>
             </a:fld>
             <a:endParaRPr lang="en-US" dirty="0"/>
           </a:p>
@@ -3844,7 +3849,7 @@
             <a:fld id="{B61BEF0D-F0BB-DE4B-95CE-6DB70DBA9567}" type="datetimeFigureOut">
               <a:rPr lang="en-US" dirty="0"/>
               <a:pPr/>
-              <a:t>12/6/2013</a:t>
+              <a:t>12/7/2013</a:t>
             </a:fld>
             <a:endParaRPr lang="en-US" dirty="0"/>
           </a:p>
@@ -4096,7 +4101,7 @@
             <a:fld id="{B61BEF0D-F0BB-DE4B-95CE-6DB70DBA9567}" type="datetimeFigureOut">
               <a:rPr lang="en-US" dirty="0"/>
               <a:pPr/>
-              <a:t>12/6/2013</a:t>
+              <a:t>12/7/2013</a:t>
             </a:fld>
             <a:endParaRPr lang="en-US" dirty="0"/>
           </a:p>
@@ -4376,7 +4381,7 @@
             <a:fld id="{B61BEF0D-F0BB-DE4B-95CE-6DB70DBA9567}" type="datetimeFigureOut">
               <a:rPr lang="en-US" dirty="0"/>
               <a:pPr/>
-              <a:t>12/6/2013</a:t>
+              <a:t>12/7/2013</a:t>
             </a:fld>
             <a:endParaRPr lang="en-US" dirty="0"/>
           </a:p>
@@ -4779,7 +4784,7 @@
             <a:fld id="{B61BEF0D-F0BB-DE4B-95CE-6DB70DBA9567}" type="datetimeFigureOut">
               <a:rPr lang="en-US" dirty="0"/>
               <a:pPr/>
-              <a:t>12/6/2013</a:t>
+              <a:t>12/7/2013</a:t>
             </a:fld>
             <a:endParaRPr lang="en-US" dirty="0"/>
           </a:p>
@@ -5549,6 +5554,13 @@
   <p:clrMapOvr>
     <a:masterClrMapping/>
   </p:clrMapOvr>
+  <p:timing>
+    <p:tnLst>
+      <p:par>
+        <p:cTn id="1" dur="indefinite" restart="never" nodeType="tmRoot"/>
+      </p:par>
+    </p:tnLst>
+  </p:timing>
 </p:sld>
 </file>
 
@@ -5644,8 +5656,12 @@
               <a:buChar char="•"/>
             </a:pPr>
             <a:r>
+              <a:rPr lang="en-US" smtClean="0"/>
+              <a:t>Hardware </a:t>
+            </a:r>
+            <a:r>
               <a:rPr lang="en-US" dirty="0" smtClean="0"/>
-              <a:t>    Hardware and software</a:t>
+              <a:t>and software</a:t>
             </a:r>
             <a:endParaRPr lang="en-US" dirty="0"/>
           </a:p>
@@ -5661,6 +5677,13 @@
   <p:clrMapOvr>
     <a:masterClrMapping/>
   </p:clrMapOvr>
+  <p:timing>
+    <p:tnLst>
+      <p:par>
+        <p:cTn id="1" dur="indefinite" restart="never" nodeType="tmRoot"/>
+      </p:par>
+    </p:tnLst>
+  </p:timing>
 </p:sld>
 </file>
 

</xml_diff>